<commit_message>
Update presentation with correct test count (248 total) and regenerate slides
</commit_message>
<xml_diff>
--- a/presentation/adaptive_qec_slides.pptx
+++ b/presentation/adaptive_qec_slides.pptx
@@ -9304,7 +9304,7 @@
               </a:defRPr>
             </a:pPr>
             <a:r>
-              <a:t>5 decoders × 4 phases of realism, 200+ unit tests</a:t>
+              <a:t>5 decoders × 4 phases of realism, 248 unit tests</a:t>
             </a:r>
           </a:p>
         </p:txBody>
@@ -10681,7 +10681,7 @@
               </a:defRPr>
             </a:pPr>
             <a:r>
-              <a:t>225+ unit tests across all phases:</a:t>
+              <a:t>248 unit tests across all phases:</a:t>
             </a:r>
           </a:p>
           <a:p>

</xml_diff>